<commit_message>
Minor updates to the ontology overview document.
</commit_message>
<xml_diff>
--- a/doc/overview.pptx
+++ b/doc/overview.pptx
@@ -290,7 +290,7 @@
           <a:p>
             <a:fld id="{1BF9B961-E8CE-4B0C-9578-2C2B903B0BA5}" type="datetimeFigureOut">
               <a:rPr lang="en-GB" smtClean="0"/>
-              <a:t>29/12/2014</a:t>
+              <a:t>07/01/2015</a:t>
             </a:fld>
             <a:endParaRPr lang="en-GB"/>
           </a:p>
@@ -460,7 +460,7 @@
           <a:p>
             <a:fld id="{1BF9B961-E8CE-4B0C-9578-2C2B903B0BA5}" type="datetimeFigureOut">
               <a:rPr lang="en-GB" smtClean="0"/>
-              <a:t>29/12/2014</a:t>
+              <a:t>07/01/2015</a:t>
             </a:fld>
             <a:endParaRPr lang="en-GB"/>
           </a:p>
@@ -640,7 +640,7 @@
           <a:p>
             <a:fld id="{1BF9B961-E8CE-4B0C-9578-2C2B903B0BA5}" type="datetimeFigureOut">
               <a:rPr lang="en-GB" smtClean="0"/>
-              <a:t>29/12/2014</a:t>
+              <a:t>07/01/2015</a:t>
             </a:fld>
             <a:endParaRPr lang="en-GB"/>
           </a:p>
@@ -810,7 +810,7 @@
           <a:p>
             <a:fld id="{1BF9B961-E8CE-4B0C-9578-2C2B903B0BA5}" type="datetimeFigureOut">
               <a:rPr lang="en-GB" smtClean="0"/>
-              <a:t>29/12/2014</a:t>
+              <a:t>07/01/2015</a:t>
             </a:fld>
             <a:endParaRPr lang="en-GB"/>
           </a:p>
@@ -1056,7 +1056,7 @@
           <a:p>
             <a:fld id="{1BF9B961-E8CE-4B0C-9578-2C2B903B0BA5}" type="datetimeFigureOut">
               <a:rPr lang="en-GB" smtClean="0"/>
-              <a:t>29/12/2014</a:t>
+              <a:t>07/01/2015</a:t>
             </a:fld>
             <a:endParaRPr lang="en-GB"/>
           </a:p>
@@ -1344,7 +1344,7 @@
           <a:p>
             <a:fld id="{1BF9B961-E8CE-4B0C-9578-2C2B903B0BA5}" type="datetimeFigureOut">
               <a:rPr lang="en-GB" smtClean="0"/>
-              <a:t>29/12/2014</a:t>
+              <a:t>07/01/2015</a:t>
             </a:fld>
             <a:endParaRPr lang="en-GB"/>
           </a:p>
@@ -1766,7 +1766,7 @@
           <a:p>
             <a:fld id="{1BF9B961-E8CE-4B0C-9578-2C2B903B0BA5}" type="datetimeFigureOut">
               <a:rPr lang="en-GB" smtClean="0"/>
-              <a:t>29/12/2014</a:t>
+              <a:t>07/01/2015</a:t>
             </a:fld>
             <a:endParaRPr lang="en-GB"/>
           </a:p>
@@ -1884,7 +1884,7 @@
           <a:p>
             <a:fld id="{1BF9B961-E8CE-4B0C-9578-2C2B903B0BA5}" type="datetimeFigureOut">
               <a:rPr lang="en-GB" smtClean="0"/>
-              <a:t>29/12/2014</a:t>
+              <a:t>07/01/2015</a:t>
             </a:fld>
             <a:endParaRPr lang="en-GB"/>
           </a:p>
@@ -1979,7 +1979,7 @@
           <a:p>
             <a:fld id="{1BF9B961-E8CE-4B0C-9578-2C2B903B0BA5}" type="datetimeFigureOut">
               <a:rPr lang="en-GB" smtClean="0"/>
-              <a:t>29/12/2014</a:t>
+              <a:t>07/01/2015</a:t>
             </a:fld>
             <a:endParaRPr lang="en-GB"/>
           </a:p>
@@ -2256,7 +2256,7 @@
           <a:p>
             <a:fld id="{1BF9B961-E8CE-4B0C-9578-2C2B903B0BA5}" type="datetimeFigureOut">
               <a:rPr lang="en-GB" smtClean="0"/>
-              <a:t>29/12/2014</a:t>
+              <a:t>07/01/2015</a:t>
             </a:fld>
             <a:endParaRPr lang="en-GB"/>
           </a:p>
@@ -2509,7 +2509,7 @@
           <a:p>
             <a:fld id="{1BF9B961-E8CE-4B0C-9578-2C2B903B0BA5}" type="datetimeFigureOut">
               <a:rPr lang="en-GB" smtClean="0"/>
-              <a:t>29/12/2014</a:t>
+              <a:t>07/01/2015</a:t>
             </a:fld>
             <a:endParaRPr lang="en-GB"/>
           </a:p>
@@ -2722,7 +2722,7 @@
           <a:p>
             <a:fld id="{1BF9B961-E8CE-4B0C-9578-2C2B903B0BA5}" type="datetimeFigureOut">
               <a:rPr lang="en-GB" smtClean="0"/>
-              <a:t>29/12/2014</a:t>
+              <a:t>07/01/2015</a:t>
             </a:fld>
             <a:endParaRPr lang="en-GB"/>
           </a:p>
@@ -4721,6 +4721,74 @@
           </a:p>
         </p:txBody>
       </p:sp>
+      <p:cxnSp>
+        <p:nvCxnSpPr>
+          <p:cNvPr id="62" name="Curved Connector 61"/>
+          <p:cNvCxnSpPr>
+            <a:stCxn id="29" idx="6"/>
+            <a:endCxn id="16" idx="1"/>
+          </p:cNvCxnSpPr>
+          <p:nvPr/>
+        </p:nvCxnSpPr>
+        <p:spPr>
+          <a:xfrm>
+            <a:off x="2509324" y="2558517"/>
+            <a:ext cx="590268" cy="178133"/>
+          </a:xfrm>
+          <a:prstGeom prst="curvedConnector3">
+            <a:avLst>
+              <a:gd name="adj1" fmla="val 50000"/>
+            </a:avLst>
+          </a:prstGeom>
+          <a:ln>
+            <a:tailEnd type="arrow"/>
+          </a:ln>
+        </p:spPr>
+        <p:style>
+          <a:lnRef idx="1">
+            <a:schemeClr val="accent1"/>
+          </a:lnRef>
+          <a:fillRef idx="0">
+            <a:schemeClr val="accent1"/>
+          </a:fillRef>
+          <a:effectRef idx="0">
+            <a:schemeClr val="accent1"/>
+          </a:effectRef>
+          <a:fontRef idx="minor">
+            <a:schemeClr val="tx1"/>
+          </a:fontRef>
+        </p:style>
+      </p:cxnSp>
+      <p:sp>
+        <p:nvSpPr>
+          <p:cNvPr id="64" name="TextBox 63"/>
+          <p:cNvSpPr txBox="1"/>
+          <p:nvPr/>
+        </p:nvSpPr>
+        <p:spPr>
+          <a:xfrm>
+            <a:off x="2407940" y="2698961"/>
+            <a:ext cx="776175" cy="246221"/>
+          </a:xfrm>
+          <a:prstGeom prst="rect">
+            <a:avLst/>
+          </a:prstGeom>
+          <a:noFill/>
+        </p:spPr>
+        <p:txBody>
+          <a:bodyPr wrap="none" rtlCol="0">
+            <a:spAutoFit/>
+          </a:bodyPr>
+          <a:lstStyle/>
+          <a:p>
+            <a:r>
+              <a:rPr lang="en-GB" sz="1000" dirty="0" smtClean="0"/>
+              <a:t>community</a:t>
+            </a:r>
+            <a:endParaRPr lang="en-GB" sz="1000" dirty="0"/>
+          </a:p>
+        </p:txBody>
+      </p:sp>
     </p:spTree>
     <p:extLst>
       <p:ext uri="{BB962C8B-B14F-4D97-AF65-F5344CB8AC3E}">
@@ -6569,6 +6637,155 @@
             <a:r>
               <a:rPr lang="en-GB" sz="1000" dirty="0" smtClean="0"/>
               <a:t>1.2.3</a:t>
+            </a:r>
+            <a:endParaRPr lang="en-GB" sz="1000" dirty="0"/>
+          </a:p>
+        </p:txBody>
+      </p:sp>
+      <p:sp>
+        <p:nvSpPr>
+          <p:cNvPr id="19" name="Rounded Rectangle 18"/>
+          <p:cNvSpPr/>
+          <p:nvPr/>
+        </p:nvSpPr>
+        <p:spPr>
+          <a:xfrm>
+            <a:off x="4349074" y="2664643"/>
+            <a:ext cx="801705" cy="373333"/>
+          </a:xfrm>
+          <a:prstGeom prst="roundRect">
+            <a:avLst/>
+          </a:prstGeom>
+          <a:noFill/>
+        </p:spPr>
+        <p:style>
+          <a:lnRef idx="2">
+            <a:schemeClr val="accent1">
+              <a:shade val="50000"/>
+            </a:schemeClr>
+          </a:lnRef>
+          <a:fillRef idx="1">
+            <a:schemeClr val="accent1"/>
+          </a:fillRef>
+          <a:effectRef idx="0">
+            <a:schemeClr val="accent1"/>
+          </a:effectRef>
+          <a:fontRef idx="minor">
+            <a:schemeClr val="lt1"/>
+          </a:fontRef>
+        </p:style>
+        <p:txBody>
+          <a:bodyPr rtlCol="0" anchor="ctr"/>
+          <a:lstStyle/>
+          <a:p>
+            <a:pPr algn="ctr"/>
+            <a:endParaRPr lang="en-GB"/>
+          </a:p>
+        </p:txBody>
+      </p:sp>
+      <p:cxnSp>
+        <p:nvCxnSpPr>
+          <p:cNvPr id="20" name="Curved Connector 19"/>
+          <p:cNvCxnSpPr>
+            <a:stCxn id="29" idx="4"/>
+            <a:endCxn id="19" idx="1"/>
+          </p:cNvCxnSpPr>
+          <p:nvPr/>
+        </p:nvCxnSpPr>
+        <p:spPr>
+          <a:xfrm rot="16200000" flipH="1">
+            <a:off x="3089415" y="1591650"/>
+            <a:ext cx="978755" cy="1540563"/>
+          </a:xfrm>
+          <a:prstGeom prst="curvedConnector2">
+            <a:avLst/>
+          </a:prstGeom>
+          <a:ln>
+            <a:tailEnd type="arrow"/>
+          </a:ln>
+        </p:spPr>
+        <p:style>
+          <a:lnRef idx="1">
+            <a:schemeClr val="accent1"/>
+          </a:lnRef>
+          <a:fillRef idx="0">
+            <a:schemeClr val="accent1"/>
+          </a:fillRef>
+          <a:effectRef idx="0">
+            <a:schemeClr val="accent1"/>
+          </a:effectRef>
+          <a:fontRef idx="minor">
+            <a:schemeClr val="tx1"/>
+          </a:fontRef>
+        </p:style>
+      </p:cxnSp>
+      <p:sp>
+        <p:nvSpPr>
+          <p:cNvPr id="24" name="TextBox 23"/>
+          <p:cNvSpPr txBox="1"/>
+          <p:nvPr/>
+        </p:nvSpPr>
+        <p:spPr>
+          <a:xfrm>
+            <a:off x="3367442" y="2440166"/>
+            <a:ext cx="1273105" cy="246221"/>
+          </a:xfrm>
+          <a:prstGeom prst="rect">
+            <a:avLst/>
+          </a:prstGeom>
+          <a:noFill/>
+        </p:spPr>
+        <p:txBody>
+          <a:bodyPr wrap="none" rtlCol="0">
+            <a:spAutoFit/>
+          </a:bodyPr>
+          <a:lstStyle/>
+          <a:p>
+            <a:r>
+              <a:rPr lang="en-GB" sz="1000" dirty="0" err="1" smtClean="0"/>
+              <a:t>dcterms:description</a:t>
+            </a:r>
+            <a:endParaRPr lang="en-GB" sz="1000" dirty="0"/>
+          </a:p>
+        </p:txBody>
+      </p:sp>
+      <p:sp>
+        <p:nvSpPr>
+          <p:cNvPr id="25" name="TextBox 24"/>
+          <p:cNvSpPr txBox="1"/>
+          <p:nvPr/>
+        </p:nvSpPr>
+        <p:spPr>
+          <a:xfrm>
+            <a:off x="4401914" y="2651254"/>
+            <a:ext cx="696023" cy="400110"/>
+          </a:xfrm>
+          <a:prstGeom prst="rect">
+            <a:avLst/>
+          </a:prstGeom>
+          <a:noFill/>
+        </p:spPr>
+        <p:txBody>
+          <a:bodyPr wrap="none" rtlCol="0">
+            <a:spAutoFit/>
+          </a:bodyPr>
+          <a:lstStyle/>
+          <a:p>
+            <a:pPr algn="ctr"/>
+            <a:r>
+              <a:rPr lang="en-GB" sz="1000" dirty="0" err="1" smtClean="0"/>
+              <a:t>paras</a:t>
+            </a:r>
+            <a:r>
+              <a:rPr lang="en-GB" sz="1000" dirty="0" smtClean="0"/>
+              <a:t> 3-5 </a:t>
+            </a:r>
+          </a:p>
+          <a:p>
+            <a:pPr algn="ctr"/>
+            <a:r>
+              <a:rPr lang="en-GB" sz="1000" dirty="0" smtClean="0"/>
+              <a:t>on page 4</a:t>
             </a:r>
             <a:endParaRPr lang="en-GB" sz="1000" dirty="0"/>
           </a:p>

</xml_diff>